<commit_message>
Generate benchmarks for trpcage_5000, ubiquitin99_5000, and ubiquitin99_500
Co-authored-by: Paradoxicaly <91711641+Paradoxicaly@users.noreply.github.com>
</commit_message>
<xml_diff>
--- a/slides/FastMDAnalysis_benchmarks_trpcage_5000.pptx
+++ b/slides/FastMDAnalysis_benchmarks_trpcage_5000.pptx
@@ -17,7 +17,6 @@
     <p:sldId id="265" r:id="rId16"/>
     <p:sldId id="266" r:id="rId17"/>
     <p:sldId id="267" r:id="rId18"/>
-    <p:sldId id="268" r:id="rId19"/>
   </p:sldIdLst>
   <p:sldSz cx="9144000" cy="6858000" type="screen4x3"/>
   <p:notesSz cx="6858000" cy="9144000"/>
@@ -3390,7 +3389,7 @@
         <p:spPr>
           <a:xfrm>
             <a:off x="457200" y="1097280"/>
-            <a:ext cx="3657600" cy="2209894"/>
+            <a:ext cx="3657600" cy="2268638"/>
           </a:xfrm>
           <a:prstGeom prst="rect">
             <a:avLst/>
@@ -3463,180 +3462,6 @@
         <p:nvPr/>
       </p:nvGrpSpPr>
       <p:grpSpPr/>
-      <p:pic>
-        <p:nvPicPr>
-          <p:cNvPr id="2" name="Picture 1" descr="orchestrator_single_run_runtime.png"/>
-          <p:cNvPicPr>
-            <a:picLocks noChangeAspect="1"/>
-          </p:cNvPicPr>
-          <p:nvPr/>
-        </p:nvPicPr>
-        <p:blipFill>
-          <a:blip r:embed="rId2"/>
-          <a:stretch>
-            <a:fillRect/>
-          </a:stretch>
-        </p:blipFill>
-        <p:spPr>
-          <a:xfrm>
-            <a:off x="457200" y="1005840"/>
-            <a:ext cx="3931920" cy="2490023"/>
-          </a:xfrm>
-          <a:prstGeom prst="rect">
-            <a:avLst/>
-          </a:prstGeom>
-        </p:spPr>
-      </p:pic>
-      <p:pic>
-        <p:nvPicPr>
-          <p:cNvPr id="3" name="Picture 2" descr="orchestrator_single_run_memory.png"/>
-          <p:cNvPicPr>
-            <a:picLocks noChangeAspect="1"/>
-          </p:cNvPicPr>
-          <p:nvPr/>
-        </p:nvPicPr>
-        <p:blipFill>
-          <a:blip r:embed="rId3"/>
-          <a:stretch>
-            <a:fillRect/>
-          </a:stretch>
-        </p:blipFill>
-        <p:spPr>
-          <a:xfrm>
-            <a:off x="4572000" y="1005840"/>
-            <a:ext cx="3931920" cy="2486361"/>
-          </a:xfrm>
-          <a:prstGeom prst="rect">
-            <a:avLst/>
-          </a:prstGeom>
-        </p:spPr>
-      </p:pic>
-      <p:pic>
-        <p:nvPicPr>
-          <p:cNvPr id="4" name="Picture 3" descr="orchestrator_single_run_analysis_breakdown.png"/>
-          <p:cNvPicPr>
-            <a:picLocks noChangeAspect="1"/>
-          </p:cNvPicPr>
-          <p:nvPr/>
-        </p:nvPicPr>
-        <p:blipFill>
-          <a:blip r:embed="rId4"/>
-          <a:stretch>
-            <a:fillRect/>
-          </a:stretch>
-        </p:blipFill>
-        <p:spPr>
-          <a:xfrm>
-            <a:off x="457200" y="4480560"/>
-            <a:ext cx="3931920" cy="2450327"/>
-          </a:xfrm>
-          <a:prstGeom prst="rect">
-            <a:avLst/>
-          </a:prstGeom>
-        </p:spPr>
-      </p:pic>
-      <p:pic>
-        <p:nvPicPr>
-          <p:cNvPr id="5" name="Picture 4" descr="orchestrator_single_run_loc.png"/>
-          <p:cNvPicPr>
-            <a:picLocks noChangeAspect="1"/>
-          </p:cNvPicPr>
-          <p:nvPr/>
-        </p:nvPicPr>
-        <p:blipFill>
-          <a:blip r:embed="rId5"/>
-          <a:stretch>
-            <a:fillRect/>
-          </a:stretch>
-        </p:blipFill>
-        <p:spPr>
-          <a:xfrm>
-            <a:off x="4572000" y="4480560"/>
-            <a:ext cx="3931920" cy="2486361"/>
-          </a:xfrm>
-          <a:prstGeom prst="rect">
-            <a:avLst/>
-          </a:prstGeom>
-        </p:spPr>
-      </p:pic>
-      <p:sp>
-        <p:nvSpPr>
-          <p:cNvPr id="6" name="TextBox 5"/>
-          <p:cNvSpPr txBox="1"/>
-          <p:nvPr/>
-        </p:nvSpPr>
-        <p:spPr>
-          <a:xfrm>
-            <a:off x="457200" y="274320"/>
-            <a:ext cx="8229600" cy="548640"/>
-          </a:xfrm>
-          <a:prstGeom prst="rect">
-            <a:avLst/>
-          </a:prstGeom>
-          <a:noFill/>
-        </p:spPr>
-        <p:txBody>
-          <a:bodyPr wrap="none">
-            <a:spAutoFit/>
-          </a:bodyPr>
-          <a:lstStyle/>
-          <a:p>
-            <a:r>
-              <a:rPr sz="2400" b="1"/>
-              <a:t>Single-run vs aggregated FastMDAnalysis</a:t>
-            </a:r>
-          </a:p>
-        </p:txBody>
-      </p:sp>
-      <p:sp>
-        <p:nvSpPr>
-          <p:cNvPr id="7" name="TextBox 6"/>
-          <p:cNvSpPr txBox="1"/>
-          <p:nvPr/>
-        </p:nvSpPr>
-        <p:spPr>
-          <a:xfrm>
-            <a:off x="457200" y="6400800"/>
-            <a:ext cx="8229600" cy="914400"/>
-          </a:xfrm>
-          <a:prstGeom prst="rect">
-            <a:avLst/>
-          </a:prstGeom>
-          <a:noFill/>
-        </p:spPr>
-        <p:txBody>
-          <a:bodyPr wrap="none">
-            <a:spAutoFit/>
-          </a:bodyPr>
-          <a:lstStyle/>
-          <a:p>
-            <a:pPr>
-              <a:defRPr sz="1200" i="1"/>
-            </a:pPr>
-            <a:r>
-              <a:t>Aggregated bars sum the computation, plotting, and overhead from individual analyze runs. Single-run bars reflect the orchestrated analyze(...) benchmark metrics for those same slices. Bottom-left chart breaks down runtime per analysis for the single run (slides counted as plotting).</a:t>
-            </a:r>
-          </a:p>
-        </p:txBody>
-      </p:sp>
-    </p:spTree>
-  </p:cSld>
-  <p:clrMapOvr>
-    <a:masterClrMapping/>
-  </p:clrMapOvr>
-</p:sld>
-</file>
-
-<file path=ppt/slides/slide13.xml><?xml version="1.0" encoding="utf-8"?>
-<p:sld xmlns:a="http://schemas.openxmlformats.org/drawingml/2006/main" xmlns:p="http://schemas.openxmlformats.org/presentationml/2006/main" xmlns:r="http://schemas.openxmlformats.org/officeDocument/2006/relationships">
-  <p:cSld>
-    <p:spTree>
-      <p:nvGrpSpPr>
-        <p:cNvPr id="1" name=""/>
-        <p:cNvGrpSpPr/>
-        <p:nvPr/>
-      </p:nvGrpSpPr>
-      <p:grpSpPr/>
       <p:sp>
         <p:nvSpPr>
           <p:cNvPr id="2" name="TextBox 1"/>
@@ -3693,7 +3518,7 @@
               <a:defRPr sz="1600"/>
             </a:pPr>
             <a:r>
-              <a:t>Snippet footprint overview: FastMDAnalysis 1 calc / 1 plot (2 total) lines, Mdtraj 21 calc / 28 plot (49 total) lines, Mdanalysis 38 calc / 28 plot (66 total) lines.</a:t>
+              <a:t>Snippet footprint overview: FastMDAnalysis 4 calc / 4 plot (8 total) lines, Mdtraj 21 calc / 28 plot (49 total) lines, Mdanalysis 38 calc / 28 plot (66 total) lines.</a:t>
             </a:r>
           </a:p>
           <a:p>
@@ -3701,7 +3526,7 @@
               <a:defRPr sz="1600"/>
             </a:pPr>
             <a:r>
-              <a:t>Runtime overview: FastMDAnalysis 1.04s calc / 4.91s plot (5.95s total), Mdtraj 0.04s calc / 2.53s plot / 0.08s overhead (2.65s total), Mdanalysis 4.16s calc / 2.78s plot / 0.01s overhead (6.95s total).</a:t>
+              <a:t>Runtime overview: FastMDAnalysis 0.23s calc / 2.51s plot / 0.09s overhead (2.83s total), Mdtraj 0.04s calc / 2.49s plot / 0.08s overhead (2.61s total), Mdanalysis 4.12s calc / 2.78s plot / 0.01s overhead (6.90s total).</a:t>
             </a:r>
           </a:p>
           <a:p>
@@ -3709,7 +3534,7 @@
               <a:defRPr sz="1200" i="1"/>
             </a:pPr>
             <a:r>
-              <a:t>Note: FastMDAnalysis timing uses single-line analyze() orchestrator approach. Calc/plot split is estimated using empirically measured ratio from individual benchmarks (17.5% computation, 82.5% plotting/saving), reflecting that matplotlib plotting and data file I/O are relatively expensive operations.</a:t>
+              <a:t>Note: FastMDAnalysis shows single-line analyze() orchestrator with integrated file I/O. Calc/plot split estimated using 17.5%/82.5% ratio from individual benchmarks. Other tools show aggregate with file I/O separated. Memory includes all analyses running together.</a:t>
             </a:r>
           </a:p>
           <a:p>
@@ -3717,7 +3542,7 @@
               <a:defRPr sz="1600"/>
             </a:pPr>
             <a:r>
-              <a:t>Peak memory overview: FastMDAnalysis 67.40 MB calc / 0.00 MB plot (67.40 MB peak), Mdtraj 6.28 MB calc / 17.20 MB plot (20.48 MB peak), Mdanalysis 1.30 MB calc / 19.19 MB plot (19.19 MB peak).</a:t>
+              <a:t>Peak memory overview: FastMDAnalysis 9.30 MB calc / 16.82 MB plot (20.06 MB peak), Mdtraj 6.39 MB calc / 17.44 MB plot (20.71 MB peak), Mdanalysis 1.30 MB calc / 18.77 MB plot (18.77 MB peak).</a:t>
             </a:r>
           </a:p>
           <a:p>
@@ -3986,30 +3811,6 @@
           <a:xfrm>
             <a:off x="457200" y="3840480"/>
             <a:ext cx="3657600" cy="2181986"/>
-          </a:xfrm>
-          <a:prstGeom prst="rect">
-            <a:avLst/>
-          </a:prstGeom>
-        </p:spPr>
-      </p:pic>
-      <p:pic>
-        <p:nvPicPr>
-          <p:cNvPr id="6" name="Picture 5" descr="orchestrator_loc_advantage.png"/>
-          <p:cNvPicPr>
-            <a:picLocks noChangeAspect="1"/>
-          </p:cNvPicPr>
-          <p:nvPr/>
-        </p:nvPicPr>
-        <p:blipFill>
-          <a:blip r:embed="rId5"/>
-          <a:stretch>
-            <a:fillRect/>
-          </a:stretch>
-        </p:blipFill>
-        <p:spPr>
-          <a:xfrm>
-            <a:off x="4572000" y="3840480"/>
-            <a:ext cx="3657600" cy="1787286"/>
           </a:xfrm>
           <a:prstGeom prst="rect">
             <a:avLst/>

</xml_diff>

<commit_message>
Regenerate benchmarks for trpcage_5000, ubiquitin99_500, and ubiquitin99_5000 with orchestrator data
Co-authored-by: Paradoxicaly <91711641+Paradoxicaly@users.noreply.github.com>
</commit_message>
<xml_diff>
--- a/slides/FastMDAnalysis_benchmarks_trpcage_5000.pptx
+++ b/slides/FastMDAnalysis_benchmarks_trpcage_5000.pptx
@@ -17,6 +17,7 @@
     <p:sldId id="265" r:id="rId16"/>
     <p:sldId id="266" r:id="rId17"/>
     <p:sldId id="267" r:id="rId18"/>
+    <p:sldId id="268" r:id="rId19"/>
   </p:sldIdLst>
   <p:sldSz cx="9144000" cy="6858000" type="screen4x3"/>
   <p:notesSz cx="6858000" cy="9144000"/>
@@ -3389,7 +3390,7 @@
         <p:spPr>
           <a:xfrm>
             <a:off x="457200" y="1097280"/>
-            <a:ext cx="3657600" cy="2268638"/>
+            <a:ext cx="3657600" cy="2209894"/>
           </a:xfrm>
           <a:prstGeom prst="rect">
             <a:avLst/>
@@ -3462,6 +3463,180 @@
         <p:nvPr/>
       </p:nvGrpSpPr>
       <p:grpSpPr/>
+      <p:pic>
+        <p:nvPicPr>
+          <p:cNvPr id="2" name="Picture 1" descr="orchestrator_single_run_runtime.png"/>
+          <p:cNvPicPr>
+            <a:picLocks noChangeAspect="1"/>
+          </p:cNvPicPr>
+          <p:nvPr/>
+        </p:nvPicPr>
+        <p:blipFill>
+          <a:blip r:embed="rId2"/>
+          <a:stretch>
+            <a:fillRect/>
+          </a:stretch>
+        </p:blipFill>
+        <p:spPr>
+          <a:xfrm>
+            <a:off x="457200" y="1005840"/>
+            <a:ext cx="3931920" cy="2490023"/>
+          </a:xfrm>
+          <a:prstGeom prst="rect">
+            <a:avLst/>
+          </a:prstGeom>
+        </p:spPr>
+      </p:pic>
+      <p:pic>
+        <p:nvPicPr>
+          <p:cNvPr id="3" name="Picture 2" descr="orchestrator_single_run_memory.png"/>
+          <p:cNvPicPr>
+            <a:picLocks noChangeAspect="1"/>
+          </p:cNvPicPr>
+          <p:nvPr/>
+        </p:nvPicPr>
+        <p:blipFill>
+          <a:blip r:embed="rId3"/>
+          <a:stretch>
+            <a:fillRect/>
+          </a:stretch>
+        </p:blipFill>
+        <p:spPr>
+          <a:xfrm>
+            <a:off x="4572000" y="1005840"/>
+            <a:ext cx="3931920" cy="2486361"/>
+          </a:xfrm>
+          <a:prstGeom prst="rect">
+            <a:avLst/>
+          </a:prstGeom>
+        </p:spPr>
+      </p:pic>
+      <p:pic>
+        <p:nvPicPr>
+          <p:cNvPr id="4" name="Picture 3" descr="orchestrator_single_run_analysis_breakdown.png"/>
+          <p:cNvPicPr>
+            <a:picLocks noChangeAspect="1"/>
+          </p:cNvPicPr>
+          <p:nvPr/>
+        </p:nvPicPr>
+        <p:blipFill>
+          <a:blip r:embed="rId4"/>
+          <a:stretch>
+            <a:fillRect/>
+          </a:stretch>
+        </p:blipFill>
+        <p:spPr>
+          <a:xfrm>
+            <a:off x="457200" y="4480560"/>
+            <a:ext cx="3931920" cy="2450327"/>
+          </a:xfrm>
+          <a:prstGeom prst="rect">
+            <a:avLst/>
+          </a:prstGeom>
+        </p:spPr>
+      </p:pic>
+      <p:pic>
+        <p:nvPicPr>
+          <p:cNvPr id="5" name="Picture 4" descr="orchestrator_single_run_loc.png"/>
+          <p:cNvPicPr>
+            <a:picLocks noChangeAspect="1"/>
+          </p:cNvPicPr>
+          <p:nvPr/>
+        </p:nvPicPr>
+        <p:blipFill>
+          <a:blip r:embed="rId5"/>
+          <a:stretch>
+            <a:fillRect/>
+          </a:stretch>
+        </p:blipFill>
+        <p:spPr>
+          <a:xfrm>
+            <a:off x="4572000" y="4480560"/>
+            <a:ext cx="3931920" cy="2486361"/>
+          </a:xfrm>
+          <a:prstGeom prst="rect">
+            <a:avLst/>
+          </a:prstGeom>
+        </p:spPr>
+      </p:pic>
+      <p:sp>
+        <p:nvSpPr>
+          <p:cNvPr id="6" name="TextBox 5"/>
+          <p:cNvSpPr txBox="1"/>
+          <p:nvPr/>
+        </p:nvSpPr>
+        <p:spPr>
+          <a:xfrm>
+            <a:off x="457200" y="274320"/>
+            <a:ext cx="8229600" cy="548640"/>
+          </a:xfrm>
+          <a:prstGeom prst="rect">
+            <a:avLst/>
+          </a:prstGeom>
+          <a:noFill/>
+        </p:spPr>
+        <p:txBody>
+          <a:bodyPr wrap="none">
+            <a:spAutoFit/>
+          </a:bodyPr>
+          <a:lstStyle/>
+          <a:p>
+            <a:r>
+              <a:rPr sz="2400" b="1"/>
+              <a:t>Single-run vs aggregated FastMDAnalysis</a:t>
+            </a:r>
+          </a:p>
+        </p:txBody>
+      </p:sp>
+      <p:sp>
+        <p:nvSpPr>
+          <p:cNvPr id="7" name="TextBox 6"/>
+          <p:cNvSpPr txBox="1"/>
+          <p:nvPr/>
+        </p:nvSpPr>
+        <p:spPr>
+          <a:xfrm>
+            <a:off x="457200" y="6400800"/>
+            <a:ext cx="8229600" cy="914400"/>
+          </a:xfrm>
+          <a:prstGeom prst="rect">
+            <a:avLst/>
+          </a:prstGeom>
+          <a:noFill/>
+        </p:spPr>
+        <p:txBody>
+          <a:bodyPr wrap="none">
+            <a:spAutoFit/>
+          </a:bodyPr>
+          <a:lstStyle/>
+          <a:p>
+            <a:pPr>
+              <a:defRPr sz="1200" i="1"/>
+            </a:pPr>
+            <a:r>
+              <a:t>Aggregated bars sum the computation, plotting, and overhead from individual analyze runs. Single-run bars reflect the orchestrated analyze(...) benchmark metrics for those same slices. Bottom-left chart breaks down runtime per analysis for the single run (slides counted as plotting).</a:t>
+            </a:r>
+          </a:p>
+        </p:txBody>
+      </p:sp>
+    </p:spTree>
+  </p:cSld>
+  <p:clrMapOvr>
+    <a:masterClrMapping/>
+  </p:clrMapOvr>
+</p:sld>
+</file>
+
+<file path=ppt/slides/slide13.xml><?xml version="1.0" encoding="utf-8"?>
+<p:sld xmlns:a="http://schemas.openxmlformats.org/drawingml/2006/main" xmlns:p="http://schemas.openxmlformats.org/presentationml/2006/main" xmlns:r="http://schemas.openxmlformats.org/officeDocument/2006/relationships">
+  <p:cSld>
+    <p:spTree>
+      <p:nvGrpSpPr>
+        <p:cNvPr id="1" name=""/>
+        <p:cNvGrpSpPr/>
+        <p:nvPr/>
+      </p:nvGrpSpPr>
+      <p:grpSpPr/>
       <p:sp>
         <p:nvSpPr>
           <p:cNvPr id="2" name="TextBox 1"/>
@@ -3518,7 +3693,7 @@
               <a:defRPr sz="1600"/>
             </a:pPr>
             <a:r>
-              <a:t>Snippet footprint overview: FastMDAnalysis 4 calc / 4 plot (8 total) lines, Mdtraj 21 calc / 28 plot (49 total) lines, Mdanalysis 38 calc / 28 plot (66 total) lines.</a:t>
+              <a:t>Snippet footprint overview: FastMDAnalysis 1 calc / 1 plot (2 total) lines, Mdtraj 21 calc / 28 plot (49 total) lines, Mdanalysis 38 calc / 28 plot (66 total) lines.</a:t>
             </a:r>
           </a:p>
           <a:p>
@@ -3526,7 +3701,7 @@
               <a:defRPr sz="1600"/>
             </a:pPr>
             <a:r>
-              <a:t>Runtime overview: FastMDAnalysis 0.23s calc / 2.51s plot / 0.09s overhead (2.83s total), Mdtraj 0.04s calc / 2.49s plot / 0.08s overhead (2.61s total), Mdanalysis 4.12s calc / 2.78s plot / 0.01s overhead (6.90s total).</a:t>
+              <a:t>Runtime overview: FastMDAnalysis 1.01s calc / 4.77s plot (5.79s total), Mdtraj 0.04s calc / 2.43s plot / 0.08s overhead (2.55s total), Mdanalysis 4.06s calc / 2.72s plot / 0.01s overhead (6.78s total).</a:t>
             </a:r>
           </a:p>
           <a:p>
@@ -3542,7 +3717,7 @@
               <a:defRPr sz="1600"/>
             </a:pPr>
             <a:r>
-              <a:t>Peak memory overview: FastMDAnalysis 9.30 MB calc / 16.82 MB plot (20.06 MB peak), Mdtraj 6.39 MB calc / 17.44 MB plot (20.71 MB peak), Mdanalysis 1.30 MB calc / 18.77 MB plot (18.77 MB peak).</a:t>
+              <a:t>Peak memory overview: FastMDAnalysis 8.36 MB calc / 39.40 MB plot (47.75 MB peak), Mdtraj 6.39 MB calc / 17.43 MB plot (20.71 MB peak), Mdanalysis 1.30 MB calc / 18.76 MB plot (18.76 MB peak).</a:t>
             </a:r>
           </a:p>
           <a:p>
@@ -3811,6 +3986,30 @@
           <a:xfrm>
             <a:off x="457200" y="3840480"/>
             <a:ext cx="3657600" cy="2181986"/>
+          </a:xfrm>
+          <a:prstGeom prst="rect">
+            <a:avLst/>
+          </a:prstGeom>
+        </p:spPr>
+      </p:pic>
+      <p:pic>
+        <p:nvPicPr>
+          <p:cNvPr id="6" name="Picture 5" descr="orchestrator_loc_advantage.png"/>
+          <p:cNvPicPr>
+            <a:picLocks noChangeAspect="1"/>
+          </p:cNvPicPr>
+          <p:nvPr/>
+        </p:nvPicPr>
+        <p:blipFill>
+          <a:blip r:embed="rId5"/>
+          <a:stretch>
+            <a:fillRect/>
+          </a:stretch>
+        </p:blipFill>
+        <p:spPr>
+          <a:xfrm>
+            <a:off x="4572000" y="3840480"/>
+            <a:ext cx="3657600" cy="1787286"/>
           </a:xfrm>
           <a:prstGeom prst="rect">
             <a:avLst/>

</xml_diff>